<commit_message>
post-session powerpoint updated with alpha helix residues
</commit_message>
<xml_diff>
--- a/GSSMaterials/Slides/091422_SecondaryStructure.pptx
+++ b/GSSMaterials/Slides/091422_SecondaryStructure.pptx
@@ -307,6 +307,7 @@
 <p1510:revInfo xmlns:a="http://schemas.openxmlformats.org/drawingml/2006/main" xmlns:r="http://schemas.openxmlformats.org/officeDocument/2006/relationships" xmlns:p1510="http://schemas.microsoft.com/office/powerpoint/2015/10/main">
   <p1510:revLst>
     <p1510:client id="{31F940D9-920A-466D-9CB8-ED264FA001ED}" v="16" dt="2022-09-14T02:07:48.823"/>
+    <p1510:client id="{A6B6885A-7E57-4A61-8566-1B4CECD361F1}" v="1" dt="2022-09-14T19:22:50.653"/>
   </p1510:revLst>
 </p1510:revInfo>
 </file>
@@ -1544,6 +1545,45 @@
       </pc:sldMasterChg>
     </pc:docChg>
   </pc:docChgLst>
+  <pc:docChgLst>
+    <pc:chgData name="David Zhao" userId="888fc9893cbb9cfb" providerId="LiveId" clId="{A6B6885A-7E57-4A61-8566-1B4CECD361F1}"/>
+    <pc:docChg chg="custSel modSld">
+      <pc:chgData name="David Zhao" userId="888fc9893cbb9cfb" providerId="LiveId" clId="{A6B6885A-7E57-4A61-8566-1B4CECD361F1}" dt="2022-09-14T19:47:53.175" v="393" actId="20577"/>
+      <pc:docMkLst>
+        <pc:docMk/>
+      </pc:docMkLst>
+      <pc:sldChg chg="modSp mod">
+        <pc:chgData name="David Zhao" userId="888fc9893cbb9cfb" providerId="LiveId" clId="{A6B6885A-7E57-4A61-8566-1B4CECD361F1}" dt="2022-09-14T19:25:17.579" v="374" actId="20577"/>
+        <pc:sldMkLst>
+          <pc:docMk/>
+          <pc:sldMk cId="3987230078" sldId="302"/>
+        </pc:sldMkLst>
+        <pc:graphicFrameChg chg="mod modGraphic">
+          <ac:chgData name="David Zhao" userId="888fc9893cbb9cfb" providerId="LiveId" clId="{A6B6885A-7E57-4A61-8566-1B4CECD361F1}" dt="2022-09-14T19:25:17.579" v="374" actId="20577"/>
+          <ac:graphicFrameMkLst>
+            <pc:docMk/>
+            <pc:sldMk cId="3987230078" sldId="302"/>
+            <ac:graphicFrameMk id="2" creationId="{F04F3ABF-A534-0B62-8439-957C948340C4}"/>
+          </ac:graphicFrameMkLst>
+        </pc:graphicFrameChg>
+      </pc:sldChg>
+      <pc:sldChg chg="modSp mod">
+        <pc:chgData name="David Zhao" userId="888fc9893cbb9cfb" providerId="LiveId" clId="{A6B6885A-7E57-4A61-8566-1B4CECD361F1}" dt="2022-09-14T19:47:53.175" v="393" actId="20577"/>
+        <pc:sldMkLst>
+          <pc:docMk/>
+          <pc:sldMk cId="4222225438" sldId="307"/>
+        </pc:sldMkLst>
+        <pc:spChg chg="mod">
+          <ac:chgData name="David Zhao" userId="888fc9893cbb9cfb" providerId="LiveId" clId="{A6B6885A-7E57-4A61-8566-1B4CECD361F1}" dt="2022-09-14T19:47:53.175" v="393" actId="20577"/>
+          <ac:spMkLst>
+            <pc:docMk/>
+            <pc:sldMk cId="4222225438" sldId="307"/>
+            <ac:spMk id="6" creationId="{CCAF7BE8-1E1A-BDC9-DAF1-DF923D1DEB9B}"/>
+          </ac:spMkLst>
+        </pc:spChg>
+      </pc:sldChg>
+    </pc:docChg>
+  </pc:docChgLst>
 </pc:chgInfo>
 </file>
 
@@ -9356,14 +9396,27 @@
             <a:endParaRPr lang="en-US" sz="1600" dirty="0"/>
           </a:p>
           <a:p>
-            <a:pPr marL="114300" indent="0">
-              <a:buNone/>
+            <a:pPr marL="400050" indent="-285750">
+              <a:buFont typeface="Arial" panose="020B0604020202020204" pitchFamily="34" charset="0"/>
+              <a:buChar char="•"/>
             </a:pPr>
-            <a:endParaRPr lang="en-US" sz="1600" dirty="0"/>
+            <a:r>
+              <a:rPr lang="en-US" sz="1600" dirty="0"/>
+              <a:t>N' - Gly-Ala-Trp-Ile-Gln-Val-Leu-</a:t>
+            </a:r>
+            <a:r>
+              <a:rPr lang="en-US" sz="1600" dirty="0" err="1"/>
+              <a:t>Asn</a:t>
+            </a:r>
+            <a:r>
+              <a:rPr lang="en-US" sz="1600" dirty="0"/>
+              <a:t>-His - C'</a:t>
+            </a:r>
           </a:p>
           <a:p>
-            <a:pPr marL="114300" indent="0">
-              <a:buNone/>
+            <a:pPr marL="400050" indent="-285750">
+              <a:buFont typeface="Arial" panose="020B0604020202020204" pitchFamily="34" charset="0"/>
+              <a:buChar char="•"/>
             </a:pPr>
             <a:endParaRPr lang="en-US" sz="1600" dirty="0"/>
           </a:p>
@@ -10627,14 +10680,14 @@
           <p:nvPr>
             <p:extLst>
               <p:ext uri="{D42A27DB-BD31-4B8C-83A1-F6EECF244321}">
-                <p14:modId xmlns:p14="http://schemas.microsoft.com/office/powerpoint/2010/main" val="4003112605"/>
+                <p14:modId xmlns:p14="http://schemas.microsoft.com/office/powerpoint/2010/main" val="1038402369"/>
               </p:ext>
             </p:extLst>
           </p:nvPr>
         </p:nvGraphicFramePr>
         <p:xfrm>
           <a:off x="776581" y="2658975"/>
-          <a:ext cx="7590836" cy="736600"/>
+          <a:ext cx="7590836" cy="1828800"/>
         </p:xfrm>
         <a:graphic>
           <a:graphicData uri="http://schemas.openxmlformats.org/drawingml/2006/table">
@@ -10757,10 +10810,13 @@
                         <a:buFont typeface="Arial" panose="020B0604020202020204" pitchFamily="34" charset="0"/>
                         <a:buChar char="•"/>
                       </a:pPr>
-                      <a:endParaRPr lang="en-US" sz="1000" dirty="0">
-                        <a:latin typeface="Teko Light" panose="020B0604020202020204" charset="0"/>
-                        <a:cs typeface="Teko Light" panose="020B0604020202020204" charset="0"/>
-                      </a:endParaRPr>
+                      <a:r>
+                        <a:rPr lang="en-US" sz="1000" dirty="0">
+                          <a:latin typeface="Teko Light" panose="020B0604020202020204" charset="0"/>
+                          <a:cs typeface="Teko Light" panose="020B0604020202020204" charset="0"/>
+                        </a:rPr>
+                        <a:t>Cysteine (C) </a:t>
+                      </a:r>
                     </a:p>
                   </a:txBody>
                   <a:tcPr/>
@@ -10774,10 +10830,65 @@
                         <a:buFont typeface="Arial" panose="020B0604020202020204" pitchFamily="34" charset="0"/>
                         <a:buChar char="•"/>
                       </a:pPr>
-                      <a:endParaRPr lang="en-US" sz="1000" dirty="0">
-                        <a:latin typeface="Teko Light" panose="020B0604020202020204" charset="0"/>
-                        <a:cs typeface="Teko Light" panose="020B0604020202020204" charset="0"/>
-                      </a:endParaRPr>
+                      <a:r>
+                        <a:rPr lang="en-US" sz="1000" dirty="0">
+                          <a:latin typeface="Teko Light" panose="020B0604020202020204" charset="0"/>
+                          <a:cs typeface="Teko Light" panose="020B0604020202020204" charset="0"/>
+                        </a:rPr>
+                        <a:t>Aspartate (-)</a:t>
+                      </a:r>
+                    </a:p>
+                    <a:p>
+                      <a:pPr marL="285750" indent="-285750" algn="l">
+                        <a:buFont typeface="Arial" panose="020B0604020202020204" pitchFamily="34" charset="0"/>
+                        <a:buChar char="•"/>
+                      </a:pPr>
+                      <a:r>
+                        <a:rPr lang="en-US" sz="1000" dirty="0">
+                          <a:latin typeface="Teko Light" panose="020B0604020202020204" charset="0"/>
+                          <a:cs typeface="Teko Light" panose="020B0604020202020204" charset="0"/>
+                        </a:rPr>
+                        <a:t>Glutamate (-)</a:t>
+                      </a:r>
+                    </a:p>
+                    <a:p>
+                      <a:pPr marL="285750" indent="-285750" algn="l">
+                        <a:buFont typeface="Arial" panose="020B0604020202020204" pitchFamily="34" charset="0"/>
+                        <a:buChar char="•"/>
+                      </a:pPr>
+                      <a:r>
+                        <a:rPr lang="en-US" sz="1000" dirty="0">
+                          <a:latin typeface="Teko Light" panose="020B0604020202020204" charset="0"/>
+                          <a:cs typeface="Teko Light" panose="020B0604020202020204" charset="0"/>
+                        </a:rPr>
+                        <a:t>Histidine (+)</a:t>
+                      </a:r>
+                    </a:p>
+                    <a:p>
+                      <a:pPr marL="285750" indent="-285750" algn="l">
+                        <a:buFont typeface="Arial" panose="020B0604020202020204" pitchFamily="34" charset="0"/>
+                        <a:buChar char="•"/>
+                      </a:pPr>
+                      <a:r>
+                        <a:rPr lang="en-US" sz="1000" dirty="0">
+                          <a:latin typeface="Teko Light" panose="020B0604020202020204" charset="0"/>
+                          <a:cs typeface="Teko Light" panose="020B0604020202020204" charset="0"/>
+                        </a:rPr>
+                        <a:t>Lysine (+)</a:t>
+                      </a:r>
+                    </a:p>
+                    <a:p>
+                      <a:pPr marL="285750" indent="-285750" algn="l">
+                        <a:buFont typeface="Arial" panose="020B0604020202020204" pitchFamily="34" charset="0"/>
+                        <a:buChar char="•"/>
+                      </a:pPr>
+                      <a:r>
+                        <a:rPr lang="en-US" sz="1000" dirty="0">
+                          <a:latin typeface="Teko Light" panose="020B0604020202020204" charset="0"/>
+                          <a:cs typeface="Teko Light" panose="020B0604020202020204" charset="0"/>
+                        </a:rPr>
+                        <a:t>Arginine (+)</a:t>
+                      </a:r>
                     </a:p>
                   </a:txBody>
                   <a:tcPr/>
@@ -10791,10 +10902,104 @@
                         <a:buFont typeface="Arial" panose="020B0604020202020204" pitchFamily="34" charset="0"/>
                         <a:buChar char="•"/>
                       </a:pPr>
-                      <a:endParaRPr lang="en-US" sz="1000" dirty="0">
-                        <a:latin typeface="Teko Light" panose="020B0604020202020204" charset="0"/>
-                        <a:cs typeface="Teko Light" panose="020B0604020202020204" charset="0"/>
-                      </a:endParaRPr>
+                      <a:r>
+                        <a:rPr lang="en-US" sz="1000" dirty="0">
+                          <a:latin typeface="Teko Light" panose="020B0604020202020204" charset="0"/>
+                          <a:cs typeface="Teko Light" panose="020B0604020202020204" charset="0"/>
+                        </a:rPr>
+                        <a:t>Serine (S)</a:t>
+                      </a:r>
+                    </a:p>
+                    <a:p>
+                      <a:pPr marL="285750" indent="-285750" algn="l">
+                        <a:buFont typeface="Arial" panose="020B0604020202020204" pitchFamily="34" charset="0"/>
+                        <a:buChar char="•"/>
+                      </a:pPr>
+                      <a:r>
+                        <a:rPr lang="en-US" sz="1000" dirty="0">
+                          <a:latin typeface="Teko Light" panose="020B0604020202020204" charset="0"/>
+                          <a:cs typeface="Teko Light" panose="020B0604020202020204" charset="0"/>
+                        </a:rPr>
+                        <a:t>Cysteine (C)</a:t>
+                      </a:r>
+                    </a:p>
+                    <a:p>
+                      <a:pPr marL="285750" indent="-285750" algn="l">
+                        <a:buFont typeface="Arial" panose="020B0604020202020204" pitchFamily="34" charset="0"/>
+                        <a:buChar char="•"/>
+                      </a:pPr>
+                      <a:r>
+                        <a:rPr lang="en-US" sz="1000" dirty="0">
+                          <a:latin typeface="Teko Light" panose="020B0604020202020204" charset="0"/>
+                          <a:cs typeface="Teko Light" panose="020B0604020202020204" charset="0"/>
+                        </a:rPr>
+                        <a:t>Glutamine (Q)</a:t>
+                      </a:r>
+                    </a:p>
+                    <a:p>
+                      <a:pPr marL="285750" indent="-285750" algn="l">
+                        <a:buFont typeface="Arial" panose="020B0604020202020204" pitchFamily="34" charset="0"/>
+                        <a:buChar char="•"/>
+                      </a:pPr>
+                      <a:r>
+                        <a:rPr lang="en-US" sz="1000" dirty="0">
+                          <a:latin typeface="Teko Light" panose="020B0604020202020204" charset="0"/>
+                          <a:cs typeface="Teko Light" panose="020B0604020202020204" charset="0"/>
+                        </a:rPr>
+                        <a:t>Asparagine (N)</a:t>
+                      </a:r>
+                    </a:p>
+                    <a:p>
+                      <a:pPr marL="285750" indent="-285750" algn="l">
+                        <a:buFont typeface="Arial" panose="020B0604020202020204" pitchFamily="34" charset="0"/>
+                        <a:buChar char="•"/>
+                      </a:pPr>
+                      <a:r>
+                        <a:rPr lang="en-US" sz="1000" dirty="0">
+                          <a:latin typeface="Teko Light" panose="020B0604020202020204" charset="0"/>
+                          <a:cs typeface="Teko Light" panose="020B0604020202020204" charset="0"/>
+                        </a:rPr>
+                        <a:t>Tyrosine (Y)</a:t>
+                      </a:r>
+                    </a:p>
+                    <a:p>
+                      <a:pPr marL="285750" indent="-285750" algn="l">
+                        <a:buFont typeface="Arial" panose="020B0604020202020204" pitchFamily="34" charset="0"/>
+                        <a:buChar char="•"/>
+                      </a:pPr>
+                      <a:r>
+                        <a:rPr lang="en-US" sz="1000" dirty="0">
+                          <a:latin typeface="Teko Light" panose="020B0604020202020204" charset="0"/>
+                          <a:cs typeface="Teko Light" panose="020B0604020202020204" charset="0"/>
+                        </a:rPr>
+                        <a:t>Tryptophan (W)</a:t>
+                      </a:r>
+                    </a:p>
+                    <a:p>
+                      <a:pPr marL="285750" indent="-285750" algn="l">
+                        <a:buFont typeface="Arial" panose="020B0604020202020204" pitchFamily="34" charset="0"/>
+                        <a:buChar char="•"/>
+                      </a:pPr>
+                      <a:r>
+                        <a:rPr lang="en-US" sz="1000" dirty="0">
+                          <a:latin typeface="Teko Light" panose="020B0604020202020204" charset="0"/>
+                          <a:cs typeface="Teko Light" panose="020B0604020202020204" charset="0"/>
+                        </a:rPr>
+                        <a:t>Histidine (H)</a:t>
+                      </a:r>
+                    </a:p>
+                    <a:p>
+                      <a:pPr marL="285750" indent="-285750" algn="l">
+                        <a:buFont typeface="Arial" panose="020B0604020202020204" pitchFamily="34" charset="0"/>
+                        <a:buChar char="•"/>
+                      </a:pPr>
+                      <a:r>
+                        <a:rPr lang="en-US" sz="1000" dirty="0">
+                          <a:latin typeface="Teko Light" panose="020B0604020202020204" charset="0"/>
+                          <a:cs typeface="Teko Light" panose="020B0604020202020204" charset="0"/>
+                        </a:rPr>
+                        <a:t>Threonine (T)</a:t>
+                      </a:r>
                     </a:p>
                   </a:txBody>
                   <a:tcPr/>
@@ -10803,6 +11008,110 @@
                   <a:txBody>
                     <a:bodyPr/>
                     <a:lstStyle/>
+                    <a:p>
+                      <a:pPr marL="285750" indent="-285750" algn="l">
+                        <a:buFont typeface="Arial" panose="020B0604020202020204" pitchFamily="34" charset="0"/>
+                        <a:buChar char="•"/>
+                      </a:pPr>
+                      <a:r>
+                        <a:rPr lang="en-US" sz="1000" dirty="0">
+                          <a:latin typeface="Teko Light" panose="020B0604020202020204" charset="0"/>
+                          <a:cs typeface="Teko Light" panose="020B0604020202020204" charset="0"/>
+                        </a:rPr>
+                        <a:t>Glycine (G)</a:t>
+                      </a:r>
+                    </a:p>
+                    <a:p>
+                      <a:pPr marL="285750" indent="-285750" algn="l">
+                        <a:buFont typeface="Arial" panose="020B0604020202020204" pitchFamily="34" charset="0"/>
+                        <a:buChar char="•"/>
+                      </a:pPr>
+                      <a:r>
+                        <a:rPr lang="en-US" sz="1000" dirty="0">
+                          <a:latin typeface="Teko Light" panose="020B0604020202020204" charset="0"/>
+                          <a:cs typeface="Teko Light" panose="020B0604020202020204" charset="0"/>
+                        </a:rPr>
+                        <a:t>Alanine (A)</a:t>
+                      </a:r>
+                    </a:p>
+                    <a:p>
+                      <a:pPr marL="285750" indent="-285750" algn="l">
+                        <a:buFont typeface="Arial" panose="020B0604020202020204" pitchFamily="34" charset="0"/>
+                        <a:buChar char="•"/>
+                      </a:pPr>
+                      <a:r>
+                        <a:rPr lang="en-US" sz="1000" dirty="0">
+                          <a:latin typeface="Teko Light" panose="020B0604020202020204" charset="0"/>
+                          <a:cs typeface="Teko Light" panose="020B0604020202020204" charset="0"/>
+                        </a:rPr>
+                        <a:t>Tryptophan (W)</a:t>
+                      </a:r>
+                    </a:p>
+                    <a:p>
+                      <a:pPr marL="285750" indent="-285750" algn="l">
+                        <a:buFont typeface="Arial" panose="020B0604020202020204" pitchFamily="34" charset="0"/>
+                        <a:buChar char="•"/>
+                      </a:pPr>
+                      <a:r>
+                        <a:rPr lang="en-US" sz="1000" dirty="0">
+                          <a:latin typeface="Teko Light" panose="020B0604020202020204" charset="0"/>
+                          <a:cs typeface="Teko Light" panose="020B0604020202020204" charset="0"/>
+                        </a:rPr>
+                        <a:t>Valine (V)</a:t>
+                      </a:r>
+                    </a:p>
+                    <a:p>
+                      <a:pPr marL="285750" indent="-285750" algn="l">
+                        <a:buFont typeface="Arial" panose="020B0604020202020204" pitchFamily="34" charset="0"/>
+                        <a:buChar char="•"/>
+                      </a:pPr>
+                      <a:r>
+                        <a:rPr lang="en-US" sz="1000" dirty="0">
+                          <a:latin typeface="Teko Light" panose="020B0604020202020204" charset="0"/>
+                          <a:cs typeface="Teko Light" panose="020B0604020202020204" charset="0"/>
+                        </a:rPr>
+                        <a:t>Leucine (L)</a:t>
+                      </a:r>
+                    </a:p>
+                    <a:p>
+                      <a:pPr marL="285750" indent="-285750" algn="l">
+                        <a:buFont typeface="Arial" panose="020B0604020202020204" pitchFamily="34" charset="0"/>
+                        <a:buChar char="•"/>
+                      </a:pPr>
+                      <a:r>
+                        <a:rPr lang="en-US" sz="1000" dirty="0">
+                          <a:latin typeface="Teko Light" panose="020B0604020202020204" charset="0"/>
+                          <a:cs typeface="Teko Light" panose="020B0604020202020204" charset="0"/>
+                        </a:rPr>
+                        <a:t>Proline (P)</a:t>
+                      </a:r>
+                    </a:p>
+                    <a:p>
+                      <a:pPr marL="285750" indent="-285750" algn="l">
+                        <a:buFont typeface="Arial" panose="020B0604020202020204" pitchFamily="34" charset="0"/>
+                        <a:buChar char="•"/>
+                      </a:pPr>
+                      <a:r>
+                        <a:rPr lang="en-US" sz="1000" dirty="0">
+                          <a:latin typeface="Teko Light" panose="020B0604020202020204" charset="0"/>
+                          <a:cs typeface="Teko Light" panose="020B0604020202020204" charset="0"/>
+                        </a:rPr>
+                        <a:t>Isoleucine (I)</a:t>
+                      </a:r>
+                    </a:p>
+                    <a:p>
+                      <a:pPr marL="285750" indent="-285750" algn="l">
+                        <a:buFont typeface="Arial" panose="020B0604020202020204" pitchFamily="34" charset="0"/>
+                        <a:buChar char="•"/>
+                      </a:pPr>
+                      <a:r>
+                        <a:rPr lang="en-US" sz="1000" dirty="0">
+                          <a:latin typeface="Teko Light" panose="020B0604020202020204" charset="0"/>
+                          <a:cs typeface="Teko Light" panose="020B0604020202020204" charset="0"/>
+                        </a:rPr>
+                        <a:t>Methionine (M)</a:t>
+                      </a:r>
+                    </a:p>
                     <a:p>
                       <a:pPr marL="285750" indent="-285750" algn="l">
                         <a:buFont typeface="Arial" panose="020B0604020202020204" pitchFamily="34" charset="0"/>
@@ -11017,13 +11326,8 @@
             </a:r>
             <a:r>
               <a:rPr lang="en-US" sz="1600" dirty="0"/>
-              <a:t>. To make things simpler, let’s not worry about the propensity of different amino acids within an alpha-helix. You are limited to 9 amino </a:t>
+              <a:t>. To make things simpler, let’s not worry about the propensity of different amino acids within an alpha-helix. You are limited to 9 amino acid residues.</a:t>
             </a:r>
-            <a:r>
-              <a:rPr lang="en-US" sz="1600"/>
-              <a:t>acid residues.</a:t>
-            </a:r>
-            <a:endParaRPr lang="en-US" sz="1600" dirty="0"/>
           </a:p>
           <a:p>
             <a:pPr marL="114300" indent="0">

</xml_diff>

<commit_message>
commit with thermo plan
</commit_message>
<xml_diff>
--- a/GSSMaterials/Slides/091422_SecondaryStructure.pptx
+++ b/GSSMaterials/Slides/091422_SecondaryStructure.pptx
@@ -306,7 +306,6 @@
 <file path=ppt/revisionInfo.xml><?xml version="1.0" encoding="utf-8"?>
 <p1510:revInfo xmlns:a="http://schemas.openxmlformats.org/drawingml/2006/main" xmlns:r="http://schemas.openxmlformats.org/officeDocument/2006/relationships" xmlns:p1510="http://schemas.microsoft.com/office/powerpoint/2015/10/main">
   <p1510:revLst>
-    <p1510:client id="{31F940D9-920A-466D-9CB8-ED264FA001ED}" v="16" dt="2022-09-14T02:07:48.823"/>
     <p1510:client id="{A6B6885A-7E57-4A61-8566-1B4CECD361F1}" v="1" dt="2022-09-14T19:22:50.653"/>
   </p1510:revLst>
 </p1510:revInfo>
@@ -1547,19 +1546,19 @@
   </pc:docChgLst>
   <pc:docChgLst>
     <pc:chgData name="David Zhao" userId="888fc9893cbb9cfb" providerId="LiveId" clId="{A6B6885A-7E57-4A61-8566-1B4CECD361F1}"/>
-    <pc:docChg chg="custSel modSld">
-      <pc:chgData name="David Zhao" userId="888fc9893cbb9cfb" providerId="LiveId" clId="{A6B6885A-7E57-4A61-8566-1B4CECD361F1}" dt="2022-09-14T19:47:53.175" v="393" actId="20577"/>
+    <pc:docChg chg="undo custSel modSld">
+      <pc:chgData name="David Zhao" userId="888fc9893cbb9cfb" providerId="LiveId" clId="{A6B6885A-7E57-4A61-8566-1B4CECD361F1}" dt="2022-09-15T19:29:41.278" v="396" actId="5793"/>
       <pc:docMkLst>
         <pc:docMk/>
       </pc:docMkLst>
       <pc:sldChg chg="modSp mod">
-        <pc:chgData name="David Zhao" userId="888fc9893cbb9cfb" providerId="LiveId" clId="{A6B6885A-7E57-4A61-8566-1B4CECD361F1}" dt="2022-09-14T19:25:17.579" v="374" actId="20577"/>
+        <pc:chgData name="David Zhao" userId="888fc9893cbb9cfb" providerId="LiveId" clId="{A6B6885A-7E57-4A61-8566-1B4CECD361F1}" dt="2022-09-15T19:29:41.278" v="396" actId="5793"/>
         <pc:sldMkLst>
           <pc:docMk/>
           <pc:sldMk cId="3987230078" sldId="302"/>
         </pc:sldMkLst>
         <pc:graphicFrameChg chg="mod modGraphic">
-          <ac:chgData name="David Zhao" userId="888fc9893cbb9cfb" providerId="LiveId" clId="{A6B6885A-7E57-4A61-8566-1B4CECD361F1}" dt="2022-09-14T19:25:17.579" v="374" actId="20577"/>
+          <ac:chgData name="David Zhao" userId="888fc9893cbb9cfb" providerId="LiveId" clId="{A6B6885A-7E57-4A61-8566-1B4CECD361F1}" dt="2022-09-15T19:29:41.278" v="396" actId="5793"/>
           <ac:graphicFrameMkLst>
             <pc:docMk/>
             <pc:sldMk cId="3987230078" sldId="302"/>
@@ -10680,7 +10679,7 @@
           <p:nvPr>
             <p:extLst>
               <p:ext uri="{D42A27DB-BD31-4B8C-83A1-F6EECF244321}">
-                <p14:modId xmlns:p14="http://schemas.microsoft.com/office/powerpoint/2010/main" val="1038402369"/>
+                <p14:modId xmlns:p14="http://schemas.microsoft.com/office/powerpoint/2010/main" val="2173048180"/>
               </p:ext>
             </p:extLst>
           </p:nvPr>
@@ -10960,19 +10959,6 @@
                           <a:cs typeface="Teko Light" panose="020B0604020202020204" charset="0"/>
                         </a:rPr>
                         <a:t>Tyrosine (Y)</a:t>
-                      </a:r>
-                    </a:p>
-                    <a:p>
-                      <a:pPr marL="285750" indent="-285750" algn="l">
-                        <a:buFont typeface="Arial" panose="020B0604020202020204" pitchFamily="34" charset="0"/>
-                        <a:buChar char="•"/>
-                      </a:pPr>
-                      <a:r>
-                        <a:rPr lang="en-US" sz="1000" dirty="0">
-                          <a:latin typeface="Teko Light" panose="020B0604020202020204" charset="0"/>
-                          <a:cs typeface="Teko Light" panose="020B0604020202020204" charset="0"/>
-                        </a:rPr>
-                        <a:t>Tryptophan (W)</a:t>
                       </a:r>
                     </a:p>
                     <a:p>

</xml_diff>